<commit_message>
Added Introduction Summarization for Publication LR
</commit_message>
<xml_diff>
--- a/documentation/university-requisite/proposal-presentation/Nature Inspired CNNs Optimization.pptx
+++ b/documentation/university-requisite/proposal-presentation/Nature Inspired CNNs Optimization.pptx
@@ -8390,7 +8390,7 @@
         <p:spPr>
           <a:xfrm>
             <a:off x="1104292" y="2909214"/>
-            <a:ext cx="8946541" cy="1400530"/>
+            <a:ext cx="8946541" cy="884719"/>
           </a:xfrm>
           <a:prstGeom prst="rect">
             <a:avLst/>
@@ -8636,7 +8636,7 @@
           <a:p>
             <a:r>
               <a:rPr lang="en-US" dirty="0"/>
-              <a:t>Parallel working efficiency</a:t>
+              <a:t>Parallel Working Efficiency</a:t>
             </a:r>
           </a:p>
           <a:p>

</xml_diff>